<commit_message>
more epochs, more kld
</commit_message>
<xml_diff>
--- a/writing/motorVAEGAN-architecture.pptx
+++ b/writing/motorVAEGAN-architecture.pptx
@@ -243,7 +243,7 @@
           <a:p>
             <a:fld id="{29EDA66B-131B-3A46-A334-2272A02F8BDA}" type="datetimeFigureOut">
               <a:rPr lang="en-US" smtClean="0"/>
-              <a:t>4/8/25</a:t>
+              <a:t>4/10/25</a:t>
             </a:fld>
             <a:endParaRPr lang="en-US"/>
           </a:p>
@@ -413,7 +413,7 @@
           <a:p>
             <a:fld id="{29EDA66B-131B-3A46-A334-2272A02F8BDA}" type="datetimeFigureOut">
               <a:rPr lang="en-US" smtClean="0"/>
-              <a:t>4/8/25</a:t>
+              <a:t>4/10/25</a:t>
             </a:fld>
             <a:endParaRPr lang="en-US"/>
           </a:p>
@@ -593,7 +593,7 @@
           <a:p>
             <a:fld id="{29EDA66B-131B-3A46-A334-2272A02F8BDA}" type="datetimeFigureOut">
               <a:rPr lang="en-US" smtClean="0"/>
-              <a:t>4/8/25</a:t>
+              <a:t>4/10/25</a:t>
             </a:fld>
             <a:endParaRPr lang="en-US"/>
           </a:p>
@@ -763,7 +763,7 @@
           <a:p>
             <a:fld id="{29EDA66B-131B-3A46-A334-2272A02F8BDA}" type="datetimeFigureOut">
               <a:rPr lang="en-US" smtClean="0"/>
-              <a:t>4/8/25</a:t>
+              <a:t>4/10/25</a:t>
             </a:fld>
             <a:endParaRPr lang="en-US"/>
           </a:p>
@@ -1009,7 +1009,7 @@
           <a:p>
             <a:fld id="{29EDA66B-131B-3A46-A334-2272A02F8BDA}" type="datetimeFigureOut">
               <a:rPr lang="en-US" smtClean="0"/>
-              <a:t>4/8/25</a:t>
+              <a:t>4/10/25</a:t>
             </a:fld>
             <a:endParaRPr lang="en-US"/>
           </a:p>
@@ -1241,7 +1241,7 @@
           <a:p>
             <a:fld id="{29EDA66B-131B-3A46-A334-2272A02F8BDA}" type="datetimeFigureOut">
               <a:rPr lang="en-US" smtClean="0"/>
-              <a:t>4/8/25</a:t>
+              <a:t>4/10/25</a:t>
             </a:fld>
             <a:endParaRPr lang="en-US"/>
           </a:p>
@@ -1608,7 +1608,7 @@
           <a:p>
             <a:fld id="{29EDA66B-131B-3A46-A334-2272A02F8BDA}" type="datetimeFigureOut">
               <a:rPr lang="en-US" smtClean="0"/>
-              <a:t>4/8/25</a:t>
+              <a:t>4/10/25</a:t>
             </a:fld>
             <a:endParaRPr lang="en-US"/>
           </a:p>
@@ -1726,7 +1726,7 @@
           <a:p>
             <a:fld id="{29EDA66B-131B-3A46-A334-2272A02F8BDA}" type="datetimeFigureOut">
               <a:rPr lang="en-US" smtClean="0"/>
-              <a:t>4/8/25</a:t>
+              <a:t>4/10/25</a:t>
             </a:fld>
             <a:endParaRPr lang="en-US"/>
           </a:p>
@@ -1821,7 +1821,7 @@
           <a:p>
             <a:fld id="{29EDA66B-131B-3A46-A334-2272A02F8BDA}" type="datetimeFigureOut">
               <a:rPr lang="en-US" smtClean="0"/>
-              <a:t>4/8/25</a:t>
+              <a:t>4/10/25</a:t>
             </a:fld>
             <a:endParaRPr lang="en-US"/>
           </a:p>
@@ -2098,7 +2098,7 @@
           <a:p>
             <a:fld id="{29EDA66B-131B-3A46-A334-2272A02F8BDA}" type="datetimeFigureOut">
               <a:rPr lang="en-US" smtClean="0"/>
-              <a:t>4/8/25</a:t>
+              <a:t>4/10/25</a:t>
             </a:fld>
             <a:endParaRPr lang="en-US"/>
           </a:p>
@@ -2355,7 +2355,7 @@
           <a:p>
             <a:fld id="{29EDA66B-131B-3A46-A334-2272A02F8BDA}" type="datetimeFigureOut">
               <a:rPr lang="en-US" smtClean="0"/>
-              <a:t>4/8/25</a:t>
+              <a:t>4/10/25</a:t>
             </a:fld>
             <a:endParaRPr lang="en-US"/>
           </a:p>
@@ -2568,7 +2568,7 @@
           <a:p>
             <a:fld id="{29EDA66B-131B-3A46-A334-2272A02F8BDA}" type="datetimeFigureOut">
               <a:rPr lang="en-US" smtClean="0"/>
-              <a:t>4/8/25</a:t>
+              <a:t>4/10/25</a:t>
             </a:fld>
             <a:endParaRPr lang="en-US"/>
           </a:p>
@@ -2991,16 +2991,16 @@
         </p:nvCxnSpPr>
         <p:spPr>
           <a:xfrm flipH="1">
-            <a:off x="12425612" y="4180706"/>
-            <a:ext cx="1" cy="695613"/>
+            <a:off x="12425611" y="3847072"/>
+            <a:ext cx="2" cy="1194296"/>
           </a:xfrm>
           <a:prstGeom prst="line">
             <a:avLst/>
           </a:prstGeom>
-          <a:ln>
+          <a:ln w="38100">
             <a:solidFill>
               <a:schemeClr val="bg1">
-                <a:lumMod val="65000"/>
+                <a:lumMod val="50000"/>
               </a:schemeClr>
             </a:solidFill>
           </a:ln>
@@ -3030,23 +3030,24 @@
             </a:extLst>
           </p:cNvPr>
           <p:cNvCxnSpPr>
-            <a:stCxn id="19" idx="4"/>
+            <a:cxnSpLocks/>
+            <a:stCxn id="16" idx="2"/>
             <a:endCxn id="1086" idx="0"/>
           </p:cNvCxnSpPr>
           <p:nvPr/>
         </p:nvCxnSpPr>
         <p:spPr>
           <a:xfrm>
-            <a:off x="5804292" y="3667679"/>
-            <a:ext cx="2687097" cy="1208640"/>
+            <a:off x="4709244" y="3513978"/>
+            <a:ext cx="4505359" cy="1014363"/>
           </a:xfrm>
           <a:prstGeom prst="line">
             <a:avLst/>
           </a:prstGeom>
-          <a:ln>
+          <a:ln w="38100">
             <a:solidFill>
               <a:schemeClr val="bg1">
-                <a:lumMod val="65000"/>
+                <a:lumMod val="50000"/>
               </a:schemeClr>
             </a:solidFill>
           </a:ln>
@@ -3084,16 +3085,16 @@
         </p:nvCxnSpPr>
         <p:spPr>
           <a:xfrm flipH="1">
-            <a:off x="8491389" y="4440071"/>
-            <a:ext cx="1827298" cy="436248"/>
+            <a:off x="9214603" y="4106437"/>
+            <a:ext cx="1104084" cy="421904"/>
           </a:xfrm>
           <a:prstGeom prst="line">
             <a:avLst/>
           </a:prstGeom>
-          <a:ln>
+          <a:ln w="38100">
             <a:solidFill>
               <a:schemeClr val="bg1">
-                <a:lumMod val="65000"/>
+                <a:lumMod val="50000"/>
               </a:schemeClr>
             </a:solidFill>
           </a:ln>
@@ -3131,16 +3132,16 @@
         </p:nvCxnSpPr>
         <p:spPr>
           <a:xfrm flipH="1">
-            <a:off x="8491389" y="4180706"/>
-            <a:ext cx="3934224" cy="695613"/>
+            <a:off x="9214603" y="3847072"/>
+            <a:ext cx="3211010" cy="681269"/>
           </a:xfrm>
           <a:prstGeom prst="line">
             <a:avLst/>
           </a:prstGeom>
-          <a:ln>
+          <a:ln w="38100">
             <a:solidFill>
               <a:schemeClr val="bg1">
-                <a:lumMod val="65000"/>
+                <a:lumMod val="50000"/>
               </a:schemeClr>
             </a:solidFill>
           </a:ln>
@@ -3182,7 +3183,7 @@
         </p:blipFill>
         <p:spPr>
           <a:xfrm>
-            <a:off x="137096" y="2601285"/>
+            <a:off x="137096" y="2267651"/>
             <a:ext cx="1039077" cy="1039077"/>
           </a:xfrm>
           <a:prstGeom prst="rect">
@@ -3195,8 +3196,8 @@
           </a:ln>
         </p:spPr>
       </p:pic>
-      <mc:AlternateContent xmlns:mc="http://schemas.openxmlformats.org/markup-compatibility/2006" xmlns:a14="http://schemas.microsoft.com/office/drawing/2010/main">
-        <mc:Choice Requires="a14">
+      <mc:AlternateContent xmlns:mc="http://schemas.openxmlformats.org/markup-compatibility/2006">
+        <mc:Choice xmlns:a14="http://schemas.microsoft.com/office/drawing/2010/main" Requires="a14">
           <p:sp>
             <p:nvSpPr>
               <p:cNvPr id="7" name="TextBox 6">
@@ -3211,7 +3212,7 @@
             </p:nvSpPr>
             <p:spPr>
               <a:xfrm>
-                <a:off x="36889" y="2132985"/>
+                <a:off x="36889" y="1799351"/>
                 <a:ext cx="1248936" cy="461665"/>
               </a:xfrm>
               <a:prstGeom prst="rect">
@@ -3257,7 +3258,7 @@
             </p:txBody>
           </p:sp>
         </mc:Choice>
-        <mc:Fallback xmlns="">
+        <mc:Fallback>
           <p:sp>
             <p:nvSpPr>
               <p:cNvPr id="7" name="TextBox 6">
@@ -3274,7 +3275,7 @@
             </p:nvSpPr>
             <p:spPr>
               <a:xfrm>
-                <a:off x="36889" y="2132985"/>
+                <a:off x="36889" y="1799351"/>
                 <a:ext cx="1248936" cy="461665"/>
               </a:xfrm>
               <a:prstGeom prst="rect">
@@ -3283,7 +3284,7 @@
               <a:blipFill>
                 <a:blip r:embed="rId3"/>
                 <a:stretch>
-                  <a:fillRect b="-8108"/>
+                  <a:fillRect b="-7895"/>
                 </a:stretch>
               </a:blipFill>
             </p:spPr>
@@ -3319,7 +3320,7 @@
         </p:nvCxnSpPr>
         <p:spPr>
           <a:xfrm>
-            <a:off x="1176174" y="3120821"/>
+            <a:off x="1176174" y="2787187"/>
             <a:ext cx="321525" cy="0"/>
           </a:xfrm>
           <a:prstGeom prst="straightConnector1">
@@ -3347,8 +3348,8 @@
           </a:fontRef>
         </p:style>
       </p:cxnSp>
-      <mc:AlternateContent xmlns:mc="http://schemas.openxmlformats.org/markup-compatibility/2006" xmlns:a14="http://schemas.microsoft.com/office/drawing/2010/main">
-        <mc:Choice Requires="a14">
+      <mc:AlternateContent xmlns:mc="http://schemas.openxmlformats.org/markup-compatibility/2006">
+        <mc:Choice xmlns:a14="http://schemas.microsoft.com/office/drawing/2010/main" Requires="a14">
           <p:sp>
             <p:nvSpPr>
               <p:cNvPr id="11" name="Rounded Rectangle 10">
@@ -3363,7 +3364,7 @@
             </p:nvSpPr>
             <p:spPr>
               <a:xfrm>
-                <a:off x="1497698" y="2052031"/>
+                <a:off x="1497698" y="1718397"/>
                 <a:ext cx="2297151" cy="2137583"/>
               </a:xfrm>
               <a:prstGeom prst="roundRect">
@@ -3620,7 +3621,7 @@
             </p:txBody>
           </p:sp>
         </mc:Choice>
-        <mc:Fallback xmlns="">
+        <mc:Fallback>
           <p:sp>
             <p:nvSpPr>
               <p:cNvPr id="11" name="Rounded Rectangle 10">
@@ -3637,7 +3638,7 @@
             </p:nvSpPr>
             <p:spPr>
               <a:xfrm>
-                <a:off x="1497698" y="2052031"/>
+                <a:off x="1497698" y="1718397"/>
                 <a:ext cx="2297151" cy="2137583"/>
               </a:xfrm>
               <a:prstGeom prst="roundRect">
@@ -3670,8 +3671,8 @@
           </p:sp>
         </mc:Fallback>
       </mc:AlternateContent>
-      <mc:AlternateContent xmlns:mc="http://schemas.openxmlformats.org/markup-compatibility/2006" xmlns:a14="http://schemas.microsoft.com/office/drawing/2010/main">
-        <mc:Choice Requires="a14">
+      <mc:AlternateContent xmlns:mc="http://schemas.openxmlformats.org/markup-compatibility/2006">
+        <mc:Choice xmlns:a14="http://schemas.microsoft.com/office/drawing/2010/main" Requires="a14">
           <p:sp>
             <p:nvSpPr>
               <p:cNvPr id="12" name="Rounded Rectangle 11">
@@ -3686,7 +3687,7 @@
             </p:nvSpPr>
             <p:spPr>
               <a:xfrm>
-                <a:off x="4352405" y="2401980"/>
+                <a:off x="4352405" y="2068346"/>
                 <a:ext cx="713678" cy="646771"/>
               </a:xfrm>
               <a:prstGeom prst="roundRect">
@@ -3748,7 +3749,7 @@
             </p:txBody>
           </p:sp>
         </mc:Choice>
-        <mc:Fallback xmlns="">
+        <mc:Fallback>
           <p:sp>
             <p:nvSpPr>
               <p:cNvPr id="12" name="Rounded Rectangle 11">
@@ -3765,7 +3766,7 @@
             </p:nvSpPr>
             <p:spPr>
               <a:xfrm>
-                <a:off x="4352405" y="2401980"/>
+                <a:off x="4352405" y="2068346"/>
                 <a:ext cx="713678" cy="646771"/>
               </a:xfrm>
               <a:prstGeom prst="roundRect">
@@ -3810,7 +3811,7 @@
         </p:nvCxnSpPr>
         <p:spPr>
           <a:xfrm>
-            <a:off x="3794848" y="2725363"/>
+            <a:off x="3794848" y="2391729"/>
             <a:ext cx="535257" cy="0"/>
           </a:xfrm>
           <a:prstGeom prst="straightConnector1">
@@ -3852,7 +3853,7 @@
         </p:nvSpPr>
         <p:spPr>
           <a:xfrm>
-            <a:off x="3659172" y="2423646"/>
+            <a:off x="3659172" y="2090012"/>
             <a:ext cx="828906" cy="276999"/>
           </a:xfrm>
           <a:prstGeom prst="rect">
@@ -3874,8 +3875,8 @@
           </a:p>
         </p:txBody>
       </p:sp>
-      <mc:AlternateContent xmlns:mc="http://schemas.openxmlformats.org/markup-compatibility/2006" xmlns:a14="http://schemas.microsoft.com/office/drawing/2010/main">
-        <mc:Choice Requires="a14">
+      <mc:AlternateContent xmlns:mc="http://schemas.openxmlformats.org/markup-compatibility/2006">
+        <mc:Choice xmlns:a14="http://schemas.microsoft.com/office/drawing/2010/main" Requires="a14">
           <p:sp>
             <p:nvSpPr>
               <p:cNvPr id="16" name="Rounded Rectangle 15">
@@ -3890,7 +3891,7 @@
             </p:nvSpPr>
             <p:spPr>
               <a:xfrm>
-                <a:off x="4352405" y="3200841"/>
+                <a:off x="4352405" y="2867207"/>
                 <a:ext cx="713678" cy="646771"/>
               </a:xfrm>
               <a:prstGeom prst="roundRect">
@@ -3993,7 +3994,7 @@
             </p:txBody>
           </p:sp>
         </mc:Choice>
-        <mc:Fallback xmlns="">
+        <mc:Fallback>
           <p:sp>
             <p:nvSpPr>
               <p:cNvPr id="16" name="Rounded Rectangle 15">
@@ -4010,7 +4011,7 @@
             </p:nvSpPr>
             <p:spPr>
               <a:xfrm>
-                <a:off x="4352405" y="3200841"/>
+                <a:off x="4352405" y="2867207"/>
                 <a:ext cx="713678" cy="646771"/>
               </a:xfrm>
               <a:prstGeom prst="roundRect">
@@ -4055,7 +4056,7 @@
         </p:nvCxnSpPr>
         <p:spPr>
           <a:xfrm>
-            <a:off x="3794848" y="3524223"/>
+            <a:off x="3794848" y="3190589"/>
             <a:ext cx="535257" cy="0"/>
           </a:xfrm>
           <a:prstGeom prst="straightConnector1">
@@ -4097,7 +4098,7 @@
         </p:nvSpPr>
         <p:spPr>
           <a:xfrm>
-            <a:off x="3659172" y="3281881"/>
+            <a:off x="3659172" y="2948247"/>
             <a:ext cx="828906" cy="276999"/>
           </a:xfrm>
           <a:prstGeom prst="rect">
@@ -4133,7 +4134,7 @@
         </p:nvSpPr>
         <p:spPr>
           <a:xfrm>
-            <a:off x="5255652" y="2570399"/>
+            <a:off x="5255652" y="2236765"/>
             <a:ext cx="1097280" cy="1097280"/>
           </a:xfrm>
           <a:prstGeom prst="ellipse">
@@ -4196,7 +4197,7 @@
         </p:nvCxnSpPr>
         <p:spPr>
           <a:xfrm flipV="1">
-            <a:off x="5066083" y="2723359"/>
+            <a:off x="5066083" y="2389725"/>
             <a:ext cx="325314" cy="2007"/>
           </a:xfrm>
           <a:prstGeom prst="straightConnector1">
@@ -4238,7 +4239,7 @@
         </p:nvSpPr>
         <p:spPr>
           <a:xfrm>
-            <a:off x="3911935" y="2062813"/>
+            <a:off x="3911935" y="1729179"/>
             <a:ext cx="1594623" cy="276999"/>
           </a:xfrm>
           <a:prstGeom prst="rect">
@@ -4280,7 +4281,7 @@
         </p:nvSpPr>
         <p:spPr>
           <a:xfrm>
-            <a:off x="5255652" y="508706"/>
+            <a:off x="5255652" y="521065"/>
             <a:ext cx="1097280" cy="1097280"/>
           </a:xfrm>
           <a:prstGeom prst="ellipse">
@@ -4369,7 +4370,7 @@
         </p:blipFill>
         <p:spPr bwMode="auto">
           <a:xfrm>
-            <a:off x="2833393" y="412053"/>
+            <a:off x="2833393" y="424412"/>
             <a:ext cx="2388807" cy="964053"/>
           </a:xfrm>
           <a:prstGeom prst="rect">
@@ -4401,7 +4402,7 @@
         </p:nvSpPr>
         <p:spPr>
           <a:xfrm>
-            <a:off x="2833393" y="148573"/>
+            <a:off x="2833393" y="160932"/>
             <a:ext cx="2388807" cy="276999"/>
           </a:xfrm>
           <a:prstGeom prst="rect">
@@ -4446,7 +4447,7 @@
         </p:nvCxnSpPr>
         <p:spPr>
           <a:xfrm>
-            <a:off x="4898814" y="1057346"/>
+            <a:off x="4898814" y="1069705"/>
             <a:ext cx="356838" cy="0"/>
           </a:xfrm>
           <a:prstGeom prst="straightConnector1">
@@ -4474,8 +4475,8 @@
           </a:fontRef>
         </p:style>
       </p:cxnSp>
-      <mc:AlternateContent xmlns:mc="http://schemas.openxmlformats.org/markup-compatibility/2006" xmlns:a14="http://schemas.microsoft.com/office/drawing/2010/main">
-        <mc:Choice Requires="a14">
+      <mc:AlternateContent xmlns:mc="http://schemas.openxmlformats.org/markup-compatibility/2006">
+        <mc:Choice xmlns:a14="http://schemas.microsoft.com/office/drawing/2010/main" Requires="a14">
           <p:sp>
             <p:nvSpPr>
               <p:cNvPr id="38" name="Rounded Rectangle 37">
@@ -4490,7 +4491,7 @@
             </p:nvSpPr>
             <p:spPr>
               <a:xfrm>
-                <a:off x="6877154" y="2052029"/>
+                <a:off x="6877154" y="1718395"/>
                 <a:ext cx="2468727" cy="2137583"/>
               </a:xfrm>
               <a:prstGeom prst="roundRect">
@@ -4832,7 +4833,7 @@
             </p:txBody>
           </p:sp>
         </mc:Choice>
-        <mc:Fallback xmlns="">
+        <mc:Fallback>
           <p:sp>
             <p:nvSpPr>
               <p:cNvPr id="38" name="Rounded Rectangle 37">
@@ -4849,7 +4850,7 @@
             </p:nvSpPr>
             <p:spPr>
               <a:xfrm>
-                <a:off x="6877154" y="2052029"/>
+                <a:off x="6877154" y="1718395"/>
                 <a:ext cx="2468727" cy="2137583"/>
               </a:xfrm>
               <a:prstGeom prst="roundRect">
@@ -4900,7 +4901,7 @@
         </p:nvCxnSpPr>
         <p:spPr>
           <a:xfrm>
-            <a:off x="6352932" y="3119039"/>
+            <a:off x="6352932" y="2785405"/>
             <a:ext cx="524222" cy="1782"/>
           </a:xfrm>
           <a:prstGeom prst="straightConnector1">
@@ -4945,8 +4946,8 @@
         </p:nvCxnSpPr>
         <p:spPr>
           <a:xfrm>
-            <a:off x="6005782" y="1541979"/>
-            <a:ext cx="871372" cy="1578842"/>
+            <a:off x="6092381" y="1578547"/>
+            <a:ext cx="784773" cy="1208640"/>
           </a:xfrm>
           <a:prstGeom prst="straightConnector1">
             <a:avLst/>
@@ -4996,7 +4997,7 @@
         </p:blipFill>
         <p:spPr>
           <a:xfrm>
-            <a:off x="9797479" y="3397655"/>
+            <a:off x="9797479" y="3064021"/>
             <a:ext cx="1042416" cy="1042416"/>
           </a:xfrm>
           <a:prstGeom prst="rect">
@@ -5023,8 +5024,8 @@
         </p:nvSpPr>
         <p:spPr>
           <a:xfrm>
-            <a:off x="9714017" y="1541978"/>
-            <a:ext cx="1248936" cy="276999"/>
+            <a:off x="9629684" y="1205882"/>
+            <a:ext cx="1375180" cy="276999"/>
           </a:xfrm>
           <a:prstGeom prst="rect">
             <a:avLst/>
@@ -5040,7 +5041,7 @@
             <a:pPr algn="ctr"/>
             <a:r>
               <a:rPr lang="en-US" sz="1200" dirty="0"/>
-              <a:t>Sample</a:t>
+              <a:t>Random Sample</a:t>
             </a:r>
           </a:p>
         </p:txBody>
@@ -5067,7 +5068,7 @@
         </p:blipFill>
         <p:spPr>
           <a:xfrm>
-            <a:off x="9796066" y="1842353"/>
+            <a:off x="9796066" y="1508719"/>
             <a:ext cx="1042416" cy="1042416"/>
           </a:xfrm>
           <a:prstGeom prst="rect">
@@ -5094,7 +5095,7 @@
         </p:nvSpPr>
         <p:spPr>
           <a:xfrm>
-            <a:off x="9714017" y="3094818"/>
+            <a:off x="9714017" y="2761184"/>
             <a:ext cx="1248936" cy="276999"/>
           </a:xfrm>
           <a:prstGeom prst="rect">
@@ -5132,7 +5133,7 @@
         </p:nvCxnSpPr>
         <p:spPr>
           <a:xfrm flipV="1">
-            <a:off x="5066083" y="3520147"/>
+            <a:off x="5066083" y="3186513"/>
             <a:ext cx="325314" cy="2007"/>
           </a:xfrm>
           <a:prstGeom prst="straightConnector1">
@@ -5160,8 +5161,8 @@
           </a:fontRef>
         </p:style>
       </p:cxnSp>
-      <mc:AlternateContent xmlns:mc="http://schemas.openxmlformats.org/markup-compatibility/2006" xmlns:a14="http://schemas.microsoft.com/office/drawing/2010/main">
-        <mc:Choice Requires="a14">
+      <mc:AlternateContent xmlns:mc="http://schemas.openxmlformats.org/markup-compatibility/2006">
+        <mc:Choice xmlns:a14="http://schemas.microsoft.com/office/drawing/2010/main" Requires="a14">
           <p:sp>
             <p:nvSpPr>
               <p:cNvPr id="1037" name="Rounded Rectangle 1036">
@@ -5176,7 +5177,7 @@
             </p:nvSpPr>
             <p:spPr>
               <a:xfrm>
-                <a:off x="11277037" y="2043123"/>
+                <a:off x="11277037" y="1709489"/>
                 <a:ext cx="2297151" cy="2137583"/>
               </a:xfrm>
               <a:prstGeom prst="roundRect">
@@ -5451,7 +5452,7 @@
             </p:txBody>
           </p:sp>
         </mc:Choice>
-        <mc:Fallback xmlns="">
+        <mc:Fallback>
           <p:sp>
             <p:nvSpPr>
               <p:cNvPr id="1037" name="Rounded Rectangle 1036">
@@ -5468,7 +5469,7 @@
             </p:nvSpPr>
             <p:spPr>
               <a:xfrm>
-                <a:off x="11277037" y="2043123"/>
+                <a:off x="11277037" y="1709489"/>
                 <a:ext cx="2297151" cy="2137583"/>
               </a:xfrm>
               <a:prstGeom prst="roundRect">
@@ -5517,7 +5518,7 @@
         </p:nvCxnSpPr>
         <p:spPr>
           <a:xfrm>
-            <a:off x="9328682" y="2363588"/>
+            <a:off x="9328682" y="2029954"/>
             <a:ext cx="420960" cy="0"/>
           </a:xfrm>
           <a:prstGeom prst="straightConnector1">
@@ -5562,7 +5563,7 @@
         </p:nvCxnSpPr>
         <p:spPr>
           <a:xfrm>
-            <a:off x="9328682" y="3913375"/>
+            <a:off x="9328682" y="3579741"/>
             <a:ext cx="420960" cy="0"/>
           </a:xfrm>
           <a:prstGeom prst="straightConnector1">
@@ -5606,7 +5607,7 @@
         </p:nvCxnSpPr>
         <p:spPr>
           <a:xfrm>
-            <a:off x="10838482" y="2363561"/>
+            <a:off x="10838482" y="2029927"/>
             <a:ext cx="420960" cy="0"/>
           </a:xfrm>
           <a:prstGeom prst="straightConnector1">
@@ -5651,7 +5652,7 @@
         </p:nvCxnSpPr>
         <p:spPr>
           <a:xfrm>
-            <a:off x="10850357" y="3913375"/>
+            <a:off x="10850357" y="3579741"/>
             <a:ext cx="420960" cy="0"/>
           </a:xfrm>
           <a:prstGeom prst="straightConnector1">
@@ -5693,8 +5694,8 @@
         </p:nvGrpSpPr>
         <p:grpSpPr>
           <a:xfrm>
-            <a:off x="640862" y="72445"/>
-            <a:ext cx="11818424" cy="2081620"/>
+            <a:off x="640862" y="86497"/>
+            <a:ext cx="11818424" cy="1733934"/>
             <a:chOff x="640862" y="72445"/>
             <a:chExt cx="11818424" cy="2081620"/>
           </a:xfrm>
@@ -5844,8 +5845,216 @@
         </p:nvSpPr>
         <p:spPr>
           <a:xfrm>
-            <a:off x="6008516" y="4876319"/>
-            <a:ext cx="4965745" cy="1039660"/>
+            <a:off x="7339928" y="4528341"/>
+            <a:ext cx="3749350" cy="1362929"/>
+          </a:xfrm>
+          <a:prstGeom prst="roundRect">
+            <a:avLst/>
+          </a:prstGeom>
+          <a:solidFill>
+            <a:schemeClr val="bg1">
+              <a:lumMod val="75000"/>
+            </a:schemeClr>
+          </a:solidFill>
+          <a:ln w="38100">
+            <a:solidFill>
+              <a:schemeClr val="tx1">
+                <a:lumMod val="50000"/>
+                <a:lumOff val="50000"/>
+              </a:schemeClr>
+            </a:solidFill>
+          </a:ln>
+        </p:spPr>
+        <p:style>
+          <a:lnRef idx="2">
+            <a:schemeClr val="accent1">
+              <a:shade val="15000"/>
+            </a:schemeClr>
+          </a:lnRef>
+          <a:fillRef idx="1">
+            <a:schemeClr val="accent1"/>
+          </a:fillRef>
+          <a:effectRef idx="0">
+            <a:schemeClr val="accent1"/>
+          </a:effectRef>
+          <a:fontRef idx="minor">
+            <a:schemeClr val="lt1"/>
+          </a:fontRef>
+        </p:style>
+        <p:txBody>
+          <a:bodyPr rtlCol="0" anchor="t"/>
+          <a:lstStyle/>
+          <a:p>
+            <a:pPr marL="182563" indent="-182563" algn="ctr"/>
+            <a:r>
+              <a:rPr lang="en-US" sz="1200" b="1" u="sng" dirty="0">
+                <a:solidFill>
+                  <a:schemeClr val="tx1"/>
+                </a:solidFill>
+              </a:rPr>
+              <a:t>VAE Loss</a:t>
+            </a:r>
+          </a:p>
+          <a:p>
+            <a:pPr marL="182563" indent="-182563" algn="ctr"/>
+            <a:endParaRPr lang="en-US" sz="800" u="sng" dirty="0">
+              <a:solidFill>
+                <a:schemeClr val="tx1"/>
+              </a:solidFill>
+            </a:endParaRPr>
+          </a:p>
+          <a:p>
+            <a:pPr marL="182563" indent="-182563">
+              <a:buFont typeface="+mj-lt"/>
+              <a:buAutoNum type="arabicPeriod"/>
+            </a:pPr>
+            <a:r>
+              <a:rPr lang="en-US" sz="1200" dirty="0">
+                <a:solidFill>
+                  <a:schemeClr val="tx1"/>
+                </a:solidFill>
+              </a:rPr>
+              <a:t>KL divergence of latent distribution from standard normal (scheduler)</a:t>
+            </a:r>
+          </a:p>
+          <a:p>
+            <a:pPr marL="182563" indent="-182563">
+              <a:buFont typeface="+mj-lt"/>
+              <a:buAutoNum type="arabicPeriod"/>
+            </a:pPr>
+            <a:r>
+              <a:rPr lang="en-US" sz="1200" dirty="0">
+                <a:solidFill>
+                  <a:schemeClr val="tx1"/>
+                </a:solidFill>
+              </a:rPr>
+              <a:t>MSE of reconstruction versus input image</a:t>
+            </a:r>
+          </a:p>
+          <a:p>
+            <a:pPr marL="182563" indent="-182563">
+              <a:buFont typeface="+mj-lt"/>
+              <a:buAutoNum type="arabicPeriod"/>
+            </a:pPr>
+            <a:r>
+              <a:rPr lang="en-US" sz="1200" dirty="0">
+                <a:solidFill>
+                  <a:schemeClr val="tx1"/>
+                </a:solidFill>
+              </a:rPr>
+              <a:t>Failing to trick discriminator with reconstructed and sample images</a:t>
+            </a:r>
+          </a:p>
+        </p:txBody>
+      </p:sp>
+      <p:sp>
+        <p:nvSpPr>
+          <p:cNvPr id="1087" name="Rounded Rectangle 1086">
+            <a:extLst>
+              <a:ext uri="{FF2B5EF4-FFF2-40B4-BE49-F238E27FC236}">
+                <a16:creationId xmlns:a16="http://schemas.microsoft.com/office/drawing/2014/main" id="{791D6881-90FE-1CF8-B11C-C4E38AFE52E2}"/>
+              </a:ext>
+            </a:extLst>
+          </p:cNvPr>
+          <p:cNvSpPr/>
+          <p:nvPr/>
+        </p:nvSpPr>
+        <p:spPr>
+          <a:xfrm>
+            <a:off x="11184174" y="5041368"/>
+            <a:ext cx="2482873" cy="849902"/>
+          </a:xfrm>
+          <a:prstGeom prst="roundRect">
+            <a:avLst/>
+          </a:prstGeom>
+          <a:solidFill>
+            <a:schemeClr val="bg1">
+              <a:lumMod val="75000"/>
+            </a:schemeClr>
+          </a:solidFill>
+          <a:ln w="38100">
+            <a:solidFill>
+              <a:schemeClr val="tx1">
+                <a:lumMod val="50000"/>
+                <a:lumOff val="50000"/>
+              </a:schemeClr>
+            </a:solidFill>
+          </a:ln>
+        </p:spPr>
+        <p:style>
+          <a:lnRef idx="2">
+            <a:schemeClr val="accent1">
+              <a:shade val="15000"/>
+            </a:schemeClr>
+          </a:lnRef>
+          <a:fillRef idx="1">
+            <a:schemeClr val="accent1"/>
+          </a:fillRef>
+          <a:effectRef idx="0">
+            <a:schemeClr val="accent1"/>
+          </a:effectRef>
+          <a:fontRef idx="minor">
+            <a:schemeClr val="lt1"/>
+          </a:fontRef>
+        </p:style>
+        <p:txBody>
+          <a:bodyPr rtlCol="0" anchor="t"/>
+          <a:lstStyle/>
+          <a:p>
+            <a:pPr algn="ctr"/>
+            <a:r>
+              <a:rPr lang="en-US" sz="1200" b="1" u="sng" dirty="0">
+                <a:solidFill>
+                  <a:schemeClr val="tx1"/>
+                </a:solidFill>
+              </a:rPr>
+              <a:t>Discriminator Loss</a:t>
+            </a:r>
+          </a:p>
+          <a:p>
+            <a:pPr algn="ctr"/>
+            <a:endParaRPr lang="en-US" sz="800" u="sng" dirty="0">
+              <a:solidFill>
+                <a:schemeClr val="tx1"/>
+              </a:solidFill>
+            </a:endParaRPr>
+          </a:p>
+          <a:p>
+            <a:r>
+              <a:rPr lang="en-US" sz="1200" dirty="0">
+                <a:solidFill>
+                  <a:schemeClr val="tx1"/>
+                </a:solidFill>
+              </a:rPr>
+              <a:t>Incorrectly identify real versus reconstructed or sample images</a:t>
+            </a:r>
+          </a:p>
+          <a:p>
+            <a:pPr algn="ctr"/>
+            <a:endParaRPr lang="en-US" sz="1200" u="sng" dirty="0">
+              <a:solidFill>
+                <a:schemeClr val="tx1"/>
+              </a:solidFill>
+            </a:endParaRPr>
+          </a:p>
+        </p:txBody>
+      </p:sp>
+      <p:sp>
+        <p:nvSpPr>
+          <p:cNvPr id="2" name="Rounded Rectangle 1">
+            <a:extLst>
+              <a:ext uri="{FF2B5EF4-FFF2-40B4-BE49-F238E27FC236}">
+                <a16:creationId xmlns:a16="http://schemas.microsoft.com/office/drawing/2014/main" id="{1A520538-8510-E03D-5676-C5C66302F4B3}"/>
+              </a:ext>
+            </a:extLst>
+          </p:cNvPr>
+          <p:cNvSpPr/>
+          <p:nvPr/>
+        </p:nvSpPr>
+        <p:spPr>
+          <a:xfrm>
+            <a:off x="48951" y="4528341"/>
+            <a:ext cx="4478187" cy="1359620"/>
           </a:xfrm>
           <a:prstGeom prst="roundRect">
             <a:avLst/>
@@ -5881,7 +6090,7 @@
           </a:fontRef>
         </p:style>
         <p:txBody>
-          <a:bodyPr rtlCol="0" anchor="t"/>
+          <a:bodyPr numCol="2" rtlCol="0" anchor="t"/>
           <a:lstStyle/>
           <a:p>
             <a:pPr algn="ctr"/>
@@ -5891,7 +6100,7 @@
                   <a:schemeClr val="tx1"/>
                 </a:solidFill>
               </a:rPr>
-              <a:t>VAE Loss</a:t>
+              <a:t>Parameters</a:t>
             </a:r>
           </a:p>
           <a:p>
@@ -5903,9 +6112,9 @@
             </a:endParaRPr>
           </a:p>
           <a:p>
-            <a:pPr marL="228600" indent="-228600">
-              <a:buFont typeface="+mj-lt"/>
-              <a:buAutoNum type="arabicPeriod"/>
+            <a:pPr marL="120650" indent="-120650">
+              <a:buFont typeface="Arial" panose="020B0604020202020204" pitchFamily="34" charset="0"/>
+              <a:buChar char="•"/>
             </a:pPr>
             <a:r>
               <a:rPr lang="en-US" sz="1200" dirty="0">
@@ -5913,13 +6122,13 @@
                   <a:schemeClr val="tx1"/>
                 </a:solidFill>
               </a:rPr>
-              <a:t>KL divergence of latent distribution from standard normal</a:t>
-            </a:r>
-          </a:p>
-          <a:p>
-            <a:pPr marL="228600" indent="-228600">
-              <a:buFont typeface="+mj-lt"/>
-              <a:buAutoNum type="arabicPeriod"/>
+              <a:t>Image size: 256</a:t>
+            </a:r>
+          </a:p>
+          <a:p>
+            <a:pPr marL="120650" indent="-120650">
+              <a:buFont typeface="Arial" panose="020B0604020202020204" pitchFamily="34" charset="0"/>
+              <a:buChar char="•"/>
             </a:pPr>
             <a:r>
               <a:rPr lang="en-US" sz="1200" dirty="0">
@@ -5927,13 +6136,13 @@
                   <a:schemeClr val="tx1"/>
                 </a:solidFill>
               </a:rPr>
-              <a:t>MSE of reconstruction versus input image</a:t>
-            </a:r>
-          </a:p>
-          <a:p>
-            <a:pPr marL="228600" indent="-228600">
-              <a:buFont typeface="+mj-lt"/>
-              <a:buAutoNum type="arabicPeriod"/>
+              <a:t>Kernel: 3, Stride: 2</a:t>
+            </a:r>
+          </a:p>
+          <a:p>
+            <a:pPr marL="120650" indent="-120650">
+              <a:buFont typeface="Arial" panose="020B0604020202020204" pitchFamily="34" charset="0"/>
+              <a:buChar char="•"/>
             </a:pPr>
             <a:r>
               <a:rPr lang="en-US" sz="1200" dirty="0">
@@ -5941,17 +6150,108 @@
                   <a:schemeClr val="tx1"/>
                 </a:solidFill>
               </a:rPr>
-              <a:t>Failing to trick discriminator with reconstructed/sample images</a:t>
-            </a:r>
-          </a:p>
-        </p:txBody>
-      </p:sp>
-      <p:sp>
-        <p:nvSpPr>
-          <p:cNvPr id="1087" name="Rounded Rectangle 1086">
+              <a:t>Latent dimensions: 128</a:t>
+            </a:r>
+          </a:p>
+          <a:p>
+            <a:pPr marL="120650" indent="-120650">
+              <a:buFont typeface="Arial" panose="020B0604020202020204" pitchFamily="34" charset="0"/>
+              <a:buChar char="•"/>
+            </a:pPr>
+            <a:r>
+              <a:rPr lang="en-US" sz="1200" dirty="0">
+                <a:solidFill>
+                  <a:schemeClr val="tx1"/>
+                </a:solidFill>
+              </a:rPr>
+              <a:t>Max KLD weight (starts at 0.01): 0.75</a:t>
+            </a:r>
+          </a:p>
+          <a:p>
+            <a:pPr marL="120650" indent="-120650">
+              <a:buFont typeface="Arial" panose="020B0604020202020204" pitchFamily="34" charset="0"/>
+              <a:buChar char="•"/>
+            </a:pPr>
+            <a:r>
+              <a:rPr lang="en-US" sz="1200" dirty="0">
+                <a:solidFill>
+                  <a:schemeClr val="tx1"/>
+                </a:solidFill>
+              </a:rPr>
+              <a:t>Adversarial weight: 1.0</a:t>
+            </a:r>
+          </a:p>
+          <a:p>
+            <a:pPr marL="120650" indent="-120650">
+              <a:buFont typeface="Arial" panose="020B0604020202020204" pitchFamily="34" charset="0"/>
+              <a:buChar char="•"/>
+            </a:pPr>
+            <a:r>
+              <a:rPr lang="en-US" sz="1200" dirty="0">
+                <a:solidFill>
+                  <a:schemeClr val="tx1"/>
+                </a:solidFill>
+              </a:rPr>
+              <a:t>Reconstruction vs sample weight: 0.5</a:t>
+            </a:r>
+          </a:p>
+          <a:p>
+            <a:pPr marL="120650" indent="-120650">
+              <a:buFont typeface="Arial" panose="020B0604020202020204" pitchFamily="34" charset="0"/>
+              <a:buChar char="•"/>
+            </a:pPr>
+            <a:r>
+              <a:rPr lang="en-US" sz="1200" dirty="0">
+                <a:solidFill>
+                  <a:schemeClr val="tx1"/>
+                </a:solidFill>
+              </a:rPr>
+              <a:t>Learning rate: 0.0001</a:t>
+            </a:r>
+          </a:p>
+          <a:p>
+            <a:pPr marL="120650" indent="-120650">
+              <a:buFont typeface="Arial" panose="020B0604020202020204" pitchFamily="34" charset="0"/>
+              <a:buChar char="•"/>
+            </a:pPr>
+            <a:r>
+              <a:rPr lang="en-US" sz="1200" dirty="0">
+                <a:solidFill>
+                  <a:schemeClr val="tx1"/>
+                </a:solidFill>
+              </a:rPr>
+              <a:t>Epochs: 150</a:t>
+            </a:r>
+          </a:p>
+          <a:p>
+            <a:pPr marL="120650" indent="-120650">
+              <a:buFont typeface="Arial" panose="020B0604020202020204" pitchFamily="34" charset="0"/>
+              <a:buChar char="•"/>
+            </a:pPr>
+            <a:r>
+              <a:rPr lang="en-US" sz="1200" dirty="0">
+                <a:solidFill>
+                  <a:schemeClr val="tx1"/>
+                </a:solidFill>
+              </a:rPr>
+              <a:t>Batch size: 128</a:t>
+            </a:r>
+          </a:p>
+          <a:p>
+            <a:endParaRPr lang="en-US" sz="1200" dirty="0">
+              <a:solidFill>
+                <a:schemeClr val="tx1"/>
+              </a:solidFill>
+            </a:endParaRPr>
+          </a:p>
+        </p:txBody>
+      </p:sp>
+      <p:sp>
+        <p:nvSpPr>
+          <p:cNvPr id="8" name="Rounded Rectangle 7">
             <a:extLst>
               <a:ext uri="{FF2B5EF4-FFF2-40B4-BE49-F238E27FC236}">
-                <a16:creationId xmlns:a16="http://schemas.microsoft.com/office/drawing/2014/main" id="{791D6881-90FE-1CF8-B11C-C4E38AFE52E2}"/>
+                <a16:creationId xmlns:a16="http://schemas.microsoft.com/office/drawing/2014/main" id="{5A056DA8-BCD6-7502-A591-CC99ED1FD59F}"/>
               </a:ext>
             </a:extLst>
           </p:cNvPr>
@@ -5960,8 +6260,8 @@
         </p:nvSpPr>
         <p:spPr>
           <a:xfrm>
-            <a:off x="11184175" y="4876319"/>
-            <a:ext cx="2482873" cy="1039660"/>
+            <a:off x="4622036" y="4308759"/>
+            <a:ext cx="2622995" cy="1579202"/>
           </a:xfrm>
           <a:prstGeom prst="roundRect">
             <a:avLst/>
@@ -5997,7 +6297,7 @@
           </a:fontRef>
         </p:style>
         <p:txBody>
-          <a:bodyPr rtlCol="0" anchor="t"/>
+          <a:bodyPr numCol="1" rtlCol="0" anchor="t"/>
           <a:lstStyle/>
           <a:p>
             <a:pPr algn="ctr"/>
@@ -6007,7 +6307,7 @@
                   <a:schemeClr val="tx1"/>
                 </a:solidFill>
               </a:rPr>
-              <a:t>Discriminator Loss</a:t>
+              <a:t>Capabilities</a:t>
             </a:r>
           </a:p>
           <a:p>
@@ -6019,22 +6319,88 @@
             </a:endParaRPr>
           </a:p>
           <a:p>
+            <a:pPr marL="120650" indent="-120650">
+              <a:buFont typeface="Arial" panose="020B0604020202020204" pitchFamily="34" charset="0"/>
+              <a:buChar char="•"/>
+            </a:pPr>
             <a:r>
               <a:rPr lang="en-US" sz="1200" dirty="0">
                 <a:solidFill>
                   <a:schemeClr val="tx1"/>
                 </a:solidFill>
               </a:rPr>
-              <a:t>Incorrectly identify real versus reconstructed or sample images</a:t>
-            </a:r>
-          </a:p>
-          <a:p>
-            <a:pPr algn="ctr"/>
-            <a:endParaRPr lang="en-US" sz="1200" u="sng" dirty="0">
-              <a:solidFill>
-                <a:schemeClr val="tx1"/>
-              </a:solidFill>
-            </a:endParaRPr>
+              <a:t>Reconstructions</a:t>
+            </a:r>
+          </a:p>
+          <a:p>
+            <a:pPr marL="120650" indent="-120650">
+              <a:buFont typeface="Arial" panose="020B0604020202020204" pitchFamily="34" charset="0"/>
+              <a:buChar char="•"/>
+            </a:pPr>
+            <a:r>
+              <a:rPr lang="en-US" sz="1200" dirty="0">
+                <a:solidFill>
+                  <a:schemeClr val="tx1"/>
+                </a:solidFill>
+              </a:rPr>
+              <a:t>Store latent distribution</a:t>
+            </a:r>
+          </a:p>
+          <a:p>
+            <a:pPr marL="120650" indent="-120650">
+              <a:buFont typeface="Arial" panose="020B0604020202020204" pitchFamily="34" charset="0"/>
+              <a:buChar char="•"/>
+            </a:pPr>
+            <a:r>
+              <a:rPr lang="en-US" sz="1200" dirty="0">
+                <a:solidFill>
+                  <a:schemeClr val="tx1"/>
+                </a:solidFill>
+              </a:rPr>
+              <a:t>Generate from random samples</a:t>
+            </a:r>
+          </a:p>
+          <a:p>
+            <a:pPr marL="120650" indent="-120650">
+              <a:buFont typeface="Arial" panose="020B0604020202020204" pitchFamily="34" charset="0"/>
+              <a:buChar char="•"/>
+            </a:pPr>
+            <a:r>
+              <a:rPr lang="en-US" sz="1200" dirty="0">
+                <a:solidFill>
+                  <a:schemeClr val="tx1"/>
+                </a:solidFill>
+              </a:rPr>
+              <a:t>Latent traversals</a:t>
+            </a:r>
+          </a:p>
+          <a:p>
+            <a:pPr marL="120650" indent="-120650">
+              <a:buFont typeface="Arial" panose="020B0604020202020204" pitchFamily="34" charset="0"/>
+              <a:buChar char="•"/>
+            </a:pPr>
+            <a:r>
+              <a:rPr lang="en-US" sz="1200" dirty="0">
+                <a:solidFill>
+                  <a:schemeClr val="tx1"/>
+                </a:solidFill>
+              </a:rPr>
+              <a:t>Interpolations</a:t>
+            </a:r>
+          </a:p>
+          <a:p>
+            <a:pPr marL="120650" indent="-120650">
+              <a:buFont typeface="Arial" panose="020B0604020202020204" pitchFamily="34" charset="0"/>
+              <a:buChar char="•"/>
+            </a:pPr>
+            <a:r>
+              <a:rPr lang="en-US" sz="1200" dirty="0">
+                <a:solidFill>
+                  <a:schemeClr val="tx1"/>
+                </a:solidFill>
+              </a:rPr>
+              <a:t>Reconstructions over epochs</a:t>
+            </a:r>
           </a:p>
         </p:txBody>
       </p:sp>

</xml_diff>